<commit_message>
SCP Tests were conducted for 200ns fault duration. The SC behavior is the same with 100ns faulty case.
</commit_message>
<xml_diff>
--- a/Weekly Reports/2020.03.02 - 2020.03.09.pptx
+++ b/Weekly Reports/2020.03.02 - 2020.03.09.pptx
@@ -5,13 +5,19 @@
     <p:sldMasterId id="2147483648" r:id="rId1"/>
   </p:sldMasterIdLst>
   <p:notesMasterIdLst>
-    <p:notesMasterId r:id="rId6"/>
+    <p:notesMasterId r:id="rId12"/>
   </p:notesMasterIdLst>
   <p:sldIdLst>
     <p:sldId id="278" r:id="rId2"/>
     <p:sldId id="279" r:id="rId3"/>
     <p:sldId id="280" r:id="rId4"/>
     <p:sldId id="281" r:id="rId5"/>
+    <p:sldId id="282" r:id="rId6"/>
+    <p:sldId id="283" r:id="rId7"/>
+    <p:sldId id="284" r:id="rId8"/>
+    <p:sldId id="285" r:id="rId9"/>
+    <p:sldId id="286" r:id="rId10"/>
+    <p:sldId id="287" r:id="rId11"/>
   </p:sldIdLst>
   <p:sldSz cx="12192000" cy="6858000"/>
   <p:notesSz cx="6858000" cy="9144000"/>
@@ -200,7 +206,7 @@
           <a:p>
             <a:fld id="{6967AB47-6931-48C6-B7ED-326D1228AFBA}" type="datetimeFigureOut">
               <a:rPr lang="tr-TR" smtClean="0"/>
-              <a:t>4.03.2020</a:t>
+              <a:t>6.03.2020</a:t>
             </a:fld>
             <a:endParaRPr lang="tr-TR"/>
           </a:p>
@@ -599,7 +605,7 @@
           <a:p>
             <a:fld id="{BD3B3769-65FE-41EA-85B6-D9F2AF76CBA9}" type="datetime1">
               <a:rPr lang="tr-TR" smtClean="0"/>
-              <a:t>4.03.2020</a:t>
+              <a:t>6.03.2020</a:t>
             </a:fld>
             <a:endParaRPr lang="tr-TR"/>
           </a:p>
@@ -769,7 +775,7 @@
           <a:p>
             <a:fld id="{2962A6A9-D976-4BDA-B10C-66B2B9DE9B4C}" type="datetime1">
               <a:rPr lang="tr-TR" smtClean="0"/>
-              <a:t>4.03.2020</a:t>
+              <a:t>6.03.2020</a:t>
             </a:fld>
             <a:endParaRPr lang="tr-TR"/>
           </a:p>
@@ -949,7 +955,7 @@
           <a:p>
             <a:fld id="{5600552A-E4D4-4B40-9929-1D3FB71F71FF}" type="datetime1">
               <a:rPr lang="tr-TR" smtClean="0"/>
-              <a:t>4.03.2020</a:t>
+              <a:t>6.03.2020</a:t>
             </a:fld>
             <a:endParaRPr lang="tr-TR"/>
           </a:p>
@@ -1119,7 +1125,7 @@
           <a:p>
             <a:fld id="{F9A85ECC-3CE4-4AD0-8EC5-3A36763AA76F}" type="datetime1">
               <a:rPr lang="tr-TR" smtClean="0"/>
-              <a:t>4.03.2020</a:t>
+              <a:t>6.03.2020</a:t>
             </a:fld>
             <a:endParaRPr lang="tr-TR"/>
           </a:p>
@@ -1365,7 +1371,7 @@
           <a:p>
             <a:fld id="{39F6AA4B-9646-44CC-B325-B50A183D6636}" type="datetime1">
               <a:rPr lang="tr-TR" smtClean="0"/>
-              <a:t>4.03.2020</a:t>
+              <a:t>6.03.2020</a:t>
             </a:fld>
             <a:endParaRPr lang="tr-TR"/>
           </a:p>
@@ -1597,7 +1603,7 @@
           <a:p>
             <a:fld id="{FD69D89B-A78C-481C-B4BE-82E51E30BA9C}" type="datetime1">
               <a:rPr lang="tr-TR" smtClean="0"/>
-              <a:t>4.03.2020</a:t>
+              <a:t>6.03.2020</a:t>
             </a:fld>
             <a:endParaRPr lang="tr-TR"/>
           </a:p>
@@ -1964,7 +1970,7 @@
           <a:p>
             <a:fld id="{473BE270-57FE-4717-982D-F02DFB5BECD5}" type="datetime1">
               <a:rPr lang="tr-TR" smtClean="0"/>
-              <a:t>4.03.2020</a:t>
+              <a:t>6.03.2020</a:t>
             </a:fld>
             <a:endParaRPr lang="tr-TR"/>
           </a:p>
@@ -2082,7 +2088,7 @@
           <a:p>
             <a:fld id="{BFAEDD45-6991-4862-9E84-DDF92EF341CB}" type="datetime1">
               <a:rPr lang="tr-TR" smtClean="0"/>
-              <a:t>4.03.2020</a:t>
+              <a:t>6.03.2020</a:t>
             </a:fld>
             <a:endParaRPr lang="tr-TR"/>
           </a:p>
@@ -2177,7 +2183,7 @@
           <a:p>
             <a:fld id="{23EE56C6-14E9-4870-96BE-3550760A1300}" type="datetime1">
               <a:rPr lang="tr-TR" smtClean="0"/>
-              <a:t>4.03.2020</a:t>
+              <a:t>6.03.2020</a:t>
             </a:fld>
             <a:endParaRPr lang="tr-TR"/>
           </a:p>
@@ -2454,7 +2460,7 @@
           <a:p>
             <a:fld id="{5EB3015D-7E17-406D-9A1A-3B2ADCD0CF79}" type="datetime1">
               <a:rPr lang="tr-TR" smtClean="0"/>
-              <a:t>4.03.2020</a:t>
+              <a:t>6.03.2020</a:t>
             </a:fld>
             <a:endParaRPr lang="tr-TR"/>
           </a:p>
@@ -2707,7 +2713,7 @@
           <a:p>
             <a:fld id="{8E1B6673-63A0-461F-BFBD-58F4D74CC1A0}" type="datetime1">
               <a:rPr lang="tr-TR" smtClean="0"/>
-              <a:t>4.03.2020</a:t>
+              <a:t>6.03.2020</a:t>
             </a:fld>
             <a:endParaRPr lang="tr-TR"/>
           </a:p>
@@ -2920,7 +2926,7 @@
           <a:p>
             <a:fld id="{9E8EF2ED-7087-4201-9521-97BB02159B09}" type="datetime1">
               <a:rPr lang="tr-TR" smtClean="0"/>
-              <a:t>4.03.2020</a:t>
+              <a:t>6.03.2020</a:t>
             </a:fld>
             <a:endParaRPr lang="tr-TR"/>
           </a:p>
@@ -3507,6 +3513,208 @@
 </p:sld>
 </file>
 
+<file path=ppt/slides/slide10.xml><?xml version="1.0" encoding="utf-8"?>
+<p:sld xmlns:a="http://schemas.openxmlformats.org/drawingml/2006/main" xmlns:r="http://schemas.openxmlformats.org/officeDocument/2006/relationships" xmlns:p="http://schemas.openxmlformats.org/presentationml/2006/main">
+  <p:cSld>
+    <p:spTree>
+      <p:nvGrpSpPr>
+        <p:cNvPr id="1" name=""/>
+        <p:cNvGrpSpPr/>
+        <p:nvPr/>
+      </p:nvGrpSpPr>
+      <p:grpSpPr>
+        <a:xfrm>
+          <a:off x="0" y="0"/>
+          <a:ext cx="0" cy="0"/>
+          <a:chOff x="0" y="0"/>
+          <a:chExt cx="0" cy="0"/>
+        </a:xfrm>
+      </p:grpSpPr>
+      <p:sp>
+        <p:nvSpPr>
+          <p:cNvPr id="4" name="Slide Number Placeholder 3"/>
+          <p:cNvSpPr>
+            <a:spLocks noGrp="1"/>
+          </p:cNvSpPr>
+          <p:nvPr>
+            <p:ph type="sldNum" sz="quarter" idx="12"/>
+          </p:nvPr>
+        </p:nvSpPr>
+        <p:spPr/>
+        <p:txBody>
+          <a:bodyPr/>
+          <a:lstStyle/>
+          <a:p>
+            <a:fld id="{178508F5-8E49-4F57-B165-331DE2AB85B8}" type="slidenum">
+              <a:rPr lang="tr-TR" sz="1800" smtClean="0"/>
+              <a:t>10</a:t>
+            </a:fld>
+            <a:endParaRPr lang="tr-TR" sz="1800" dirty="0"/>
+          </a:p>
+        </p:txBody>
+      </p:sp>
+      <p:sp>
+        <p:nvSpPr>
+          <p:cNvPr id="3" name="TextBox 2"/>
+          <p:cNvSpPr txBox="1"/>
+          <p:nvPr/>
+        </p:nvSpPr>
+        <p:spPr>
+          <a:xfrm>
+            <a:off x="223247" y="93354"/>
+            <a:ext cx="3598145" cy="461665"/>
+          </a:xfrm>
+          <a:prstGeom prst="rect">
+            <a:avLst/>
+          </a:prstGeom>
+          <a:noFill/>
+        </p:spPr>
+        <p:txBody>
+          <a:bodyPr wrap="square" rtlCol="0">
+            <a:spAutoFit/>
+          </a:bodyPr>
+          <a:lstStyle/>
+          <a:p>
+            <a:r>
+              <a:rPr lang="tr-TR" sz="2400" b="1" dirty="0" smtClean="0"/>
+              <a:t>SCT</a:t>
+            </a:r>
+            <a:endParaRPr lang="tr-TR" sz="2400" b="1" dirty="0"/>
+          </a:p>
+        </p:txBody>
+      </p:sp>
+      <p:sp>
+        <p:nvSpPr>
+          <p:cNvPr id="12" name="TextBox 11"/>
+          <p:cNvSpPr txBox="1"/>
+          <p:nvPr/>
+        </p:nvSpPr>
+        <p:spPr>
+          <a:xfrm>
+            <a:off x="2865195" y="5475626"/>
+            <a:ext cx="709200" cy="369332"/>
+          </a:xfrm>
+          <a:prstGeom prst="rect">
+            <a:avLst/>
+          </a:prstGeom>
+          <a:noFill/>
+        </p:spPr>
+        <p:txBody>
+          <a:bodyPr wrap="square" rtlCol="0">
+            <a:spAutoFit/>
+          </a:bodyPr>
+          <a:lstStyle/>
+          <a:p>
+            <a:r>
+              <a:rPr lang="tr-TR" dirty="0"/>
+              <a:t>3</a:t>
+            </a:r>
+            <a:r>
+              <a:rPr lang="tr-TR" dirty="0" smtClean="0"/>
+              <a:t>00V</a:t>
+            </a:r>
+            <a:endParaRPr lang="tr-TR" dirty="0"/>
+          </a:p>
+        </p:txBody>
+      </p:sp>
+      <p:sp>
+        <p:nvSpPr>
+          <p:cNvPr id="13" name="TextBox 12"/>
+          <p:cNvSpPr txBox="1"/>
+          <p:nvPr/>
+        </p:nvSpPr>
+        <p:spPr>
+          <a:xfrm>
+            <a:off x="8426410" y="5475626"/>
+            <a:ext cx="709200" cy="369332"/>
+          </a:xfrm>
+          <a:prstGeom prst="rect">
+            <a:avLst/>
+          </a:prstGeom>
+          <a:noFill/>
+        </p:spPr>
+        <p:txBody>
+          <a:bodyPr wrap="square" rtlCol="0">
+            <a:spAutoFit/>
+          </a:bodyPr>
+          <a:lstStyle/>
+          <a:p>
+            <a:r>
+              <a:rPr lang="tr-TR" dirty="0" smtClean="0"/>
+              <a:t>400V</a:t>
+            </a:r>
+            <a:endParaRPr lang="tr-TR" dirty="0"/>
+          </a:p>
+        </p:txBody>
+      </p:sp>
+      <p:pic>
+        <p:nvPicPr>
+          <p:cNvPr id="2" name="Picture 1"/>
+          <p:cNvPicPr>
+            <a:picLocks noChangeAspect="1"/>
+          </p:cNvPicPr>
+          <p:nvPr/>
+        </p:nvPicPr>
+        <p:blipFill>
+          <a:blip r:embed="rId2"/>
+          <a:stretch>
+            <a:fillRect/>
+          </a:stretch>
+        </p:blipFill>
+        <p:spPr>
+          <a:xfrm>
+            <a:off x="542294" y="1415626"/>
+            <a:ext cx="5355001" cy="4060000"/>
+          </a:xfrm>
+          <a:prstGeom prst="rect">
+            <a:avLst/>
+          </a:prstGeom>
+        </p:spPr>
+      </p:pic>
+      <p:pic>
+        <p:nvPicPr>
+          <p:cNvPr id="5" name="Picture 4"/>
+          <p:cNvPicPr>
+            <a:picLocks noChangeAspect="1"/>
+          </p:cNvPicPr>
+          <p:nvPr/>
+        </p:nvPicPr>
+        <p:blipFill>
+          <a:blip r:embed="rId3"/>
+          <a:stretch>
+            <a:fillRect/>
+          </a:stretch>
+        </p:blipFill>
+        <p:spPr>
+          <a:xfrm>
+            <a:off x="6103509" y="1415626"/>
+            <a:ext cx="5355001" cy="4060000"/>
+          </a:xfrm>
+          <a:prstGeom prst="rect">
+            <a:avLst/>
+          </a:prstGeom>
+        </p:spPr>
+      </p:pic>
+    </p:spTree>
+    <p:extLst>
+      <p:ext uri="{BB962C8B-B14F-4D97-AF65-F5344CB8AC3E}">
+        <p14:creationId xmlns:p14="http://schemas.microsoft.com/office/powerpoint/2010/main" val="174771429"/>
+      </p:ext>
+    </p:extLst>
+  </p:cSld>
+  <p:clrMapOvr>
+    <a:masterClrMapping/>
+  </p:clrMapOvr>
+  <p:timing>
+    <p:tnLst>
+      <p:par>
+        <p:cTn id="1" dur="indefinite" restart="never" nodeType="tmRoot"/>
+      </p:par>
+    </p:tnLst>
+  </p:timing>
+</p:sld>
+</file>
+
 <file path=ppt/slides/slide2.xml><?xml version="1.0" encoding="utf-8"?>
 <p:sld xmlns:a="http://schemas.openxmlformats.org/drawingml/2006/main" xmlns:r="http://schemas.openxmlformats.org/officeDocument/2006/relationships" xmlns:p="http://schemas.openxmlformats.org/presentationml/2006/main">
   <p:cSld>
@@ -4118,6 +4326,1314 @@
     <p:extLst>
       <p:ext uri="{BB962C8B-B14F-4D97-AF65-F5344CB8AC3E}">
         <p14:creationId xmlns:p14="http://schemas.microsoft.com/office/powerpoint/2010/main" val="4033053909"/>
+      </p:ext>
+    </p:extLst>
+  </p:cSld>
+  <p:clrMapOvr>
+    <a:masterClrMapping/>
+  </p:clrMapOvr>
+  <p:timing>
+    <p:tnLst>
+      <p:par>
+        <p:cTn id="1" dur="indefinite" restart="never" nodeType="tmRoot"/>
+      </p:par>
+    </p:tnLst>
+  </p:timing>
+</p:sld>
+</file>
+
+<file path=ppt/slides/slide5.xml><?xml version="1.0" encoding="utf-8"?>
+<p:sld xmlns:a="http://schemas.openxmlformats.org/drawingml/2006/main" xmlns:r="http://schemas.openxmlformats.org/officeDocument/2006/relationships" xmlns:p="http://schemas.openxmlformats.org/presentationml/2006/main">
+  <p:cSld>
+    <p:spTree>
+      <p:nvGrpSpPr>
+        <p:cNvPr id="1" name=""/>
+        <p:cNvGrpSpPr/>
+        <p:nvPr/>
+      </p:nvGrpSpPr>
+      <p:grpSpPr>
+        <a:xfrm>
+          <a:off x="0" y="0"/>
+          <a:ext cx="0" cy="0"/>
+          <a:chOff x="0" y="0"/>
+          <a:chExt cx="0" cy="0"/>
+        </a:xfrm>
+      </p:grpSpPr>
+      <p:sp>
+        <p:nvSpPr>
+          <p:cNvPr id="4" name="Slide Number Placeholder 3"/>
+          <p:cNvSpPr>
+            <a:spLocks noGrp="1"/>
+          </p:cNvSpPr>
+          <p:nvPr>
+            <p:ph type="sldNum" sz="quarter" idx="12"/>
+          </p:nvPr>
+        </p:nvSpPr>
+        <p:spPr/>
+        <p:txBody>
+          <a:bodyPr/>
+          <a:lstStyle/>
+          <a:p>
+            <a:fld id="{178508F5-8E49-4F57-B165-331DE2AB85B8}" type="slidenum">
+              <a:rPr lang="tr-TR" sz="1800" smtClean="0"/>
+              <a:t>5</a:t>
+            </a:fld>
+            <a:endParaRPr lang="tr-TR" sz="1800" dirty="0"/>
+          </a:p>
+        </p:txBody>
+      </p:sp>
+      <p:sp>
+        <p:nvSpPr>
+          <p:cNvPr id="3" name="TextBox 2"/>
+          <p:cNvSpPr txBox="1"/>
+          <p:nvPr/>
+        </p:nvSpPr>
+        <p:spPr>
+          <a:xfrm>
+            <a:off x="223247" y="93354"/>
+            <a:ext cx="3598145" cy="461665"/>
+          </a:xfrm>
+          <a:prstGeom prst="rect">
+            <a:avLst/>
+          </a:prstGeom>
+          <a:noFill/>
+        </p:spPr>
+        <p:txBody>
+          <a:bodyPr wrap="square" rtlCol="0">
+            <a:spAutoFit/>
+          </a:bodyPr>
+          <a:lstStyle/>
+          <a:p>
+            <a:r>
+              <a:rPr lang="tr-TR" sz="2400" b="1" dirty="0" smtClean="0"/>
+              <a:t>SCT</a:t>
+            </a:r>
+            <a:endParaRPr lang="tr-TR" sz="2400" b="1" dirty="0"/>
+          </a:p>
+        </p:txBody>
+      </p:sp>
+      <p:sp>
+        <p:nvSpPr>
+          <p:cNvPr id="14" name="TextBox 13"/>
+          <p:cNvSpPr txBox="1"/>
+          <p:nvPr/>
+        </p:nvSpPr>
+        <p:spPr>
+          <a:xfrm>
+            <a:off x="7280563" y="5068302"/>
+            <a:ext cx="2660073" cy="923330"/>
+          </a:xfrm>
+          <a:prstGeom prst="rect">
+            <a:avLst/>
+          </a:prstGeom>
+          <a:noFill/>
+        </p:spPr>
+        <p:txBody>
+          <a:bodyPr wrap="square" rtlCol="0">
+            <a:spAutoFit/>
+          </a:bodyPr>
+          <a:lstStyle/>
+          <a:p>
+            <a:r>
+              <a:rPr lang="tr-TR" dirty="0" smtClean="0"/>
+              <a:t>We have a clear noise problem which requires filtering for best result</a:t>
+            </a:r>
+            <a:endParaRPr lang="tr-TR" dirty="0"/>
+          </a:p>
+        </p:txBody>
+      </p:sp>
+      <p:pic>
+        <p:nvPicPr>
+          <p:cNvPr id="7" name="Picture 6"/>
+          <p:cNvPicPr>
+            <a:picLocks noChangeAspect="1"/>
+          </p:cNvPicPr>
+          <p:nvPr/>
+        </p:nvPicPr>
+        <p:blipFill>
+          <a:blip r:embed="rId2"/>
+          <a:stretch>
+            <a:fillRect/>
+          </a:stretch>
+        </p:blipFill>
+        <p:spPr>
+          <a:xfrm>
+            <a:off x="0" y="1008302"/>
+            <a:ext cx="5355001" cy="4060000"/>
+          </a:xfrm>
+          <a:prstGeom prst="rect">
+            <a:avLst/>
+          </a:prstGeom>
+        </p:spPr>
+      </p:pic>
+      <p:pic>
+        <p:nvPicPr>
+          <p:cNvPr id="10" name="Picture 9"/>
+          <p:cNvPicPr>
+            <a:picLocks noChangeAspect="1"/>
+          </p:cNvPicPr>
+          <p:nvPr/>
+        </p:nvPicPr>
+        <p:blipFill>
+          <a:blip r:embed="rId3"/>
+          <a:stretch>
+            <a:fillRect/>
+          </a:stretch>
+        </p:blipFill>
+        <p:spPr>
+          <a:xfrm>
+            <a:off x="5739938" y="1008302"/>
+            <a:ext cx="5355001" cy="4060000"/>
+          </a:xfrm>
+          <a:prstGeom prst="rect">
+            <a:avLst/>
+          </a:prstGeom>
+        </p:spPr>
+      </p:pic>
+      <p:pic>
+        <p:nvPicPr>
+          <p:cNvPr id="11" name="Picture 10"/>
+          <p:cNvPicPr>
+            <a:picLocks noChangeAspect="1"/>
+          </p:cNvPicPr>
+          <p:nvPr/>
+        </p:nvPicPr>
+        <p:blipFill rotWithShape="1">
+          <a:blip r:embed="rId4"/>
+          <a:srcRect l="16729" t="7924" r="25059" b="12020"/>
+          <a:stretch/>
+        </p:blipFill>
+        <p:spPr>
+          <a:xfrm>
+            <a:off x="8610600" y="1408109"/>
+            <a:ext cx="1408205" cy="1468288"/>
+          </a:xfrm>
+          <a:prstGeom prst="rect">
+            <a:avLst/>
+          </a:prstGeom>
+        </p:spPr>
+      </p:pic>
+      <p:cxnSp>
+        <p:nvCxnSpPr>
+          <p:cNvPr id="16" name="Straight Arrow Connector 15"/>
+          <p:cNvCxnSpPr/>
+          <p:nvPr/>
+        </p:nvCxnSpPr>
+        <p:spPr>
+          <a:xfrm flipV="1">
+            <a:off x="8049017" y="2315615"/>
+            <a:ext cx="831273" cy="399219"/>
+          </a:xfrm>
+          <a:prstGeom prst="straightConnector1">
+            <a:avLst/>
+          </a:prstGeom>
+          <a:ln w="28575">
+            <a:solidFill>
+              <a:schemeClr val="tx1"/>
+            </a:solidFill>
+            <a:tailEnd type="triangle"/>
+          </a:ln>
+        </p:spPr>
+        <p:style>
+          <a:lnRef idx="1">
+            <a:schemeClr val="accent1"/>
+          </a:lnRef>
+          <a:fillRef idx="0">
+            <a:schemeClr val="accent1"/>
+          </a:fillRef>
+          <a:effectRef idx="0">
+            <a:schemeClr val="accent1"/>
+          </a:effectRef>
+          <a:fontRef idx="minor">
+            <a:schemeClr val="tx1"/>
+          </a:fontRef>
+        </p:style>
+      </p:cxnSp>
+      <p:sp>
+        <p:nvSpPr>
+          <p:cNvPr id="20" name="TextBox 19"/>
+          <p:cNvSpPr txBox="1"/>
+          <p:nvPr/>
+        </p:nvSpPr>
+        <p:spPr>
+          <a:xfrm>
+            <a:off x="1583145" y="5250661"/>
+            <a:ext cx="2188710" cy="369332"/>
+          </a:xfrm>
+          <a:prstGeom prst="rect">
+            <a:avLst/>
+          </a:prstGeom>
+          <a:noFill/>
+        </p:spPr>
+        <p:txBody>
+          <a:bodyPr wrap="square" rtlCol="0">
+            <a:spAutoFit/>
+          </a:bodyPr>
+          <a:lstStyle/>
+          <a:p>
+            <a:r>
+              <a:rPr lang="tr-TR" dirty="0" smtClean="0"/>
+              <a:t>SC exists for 100 nsec</a:t>
+            </a:r>
+            <a:endParaRPr lang="tr-TR" dirty="0"/>
+          </a:p>
+        </p:txBody>
+      </p:sp>
+      <p:cxnSp>
+        <p:nvCxnSpPr>
+          <p:cNvPr id="21" name="Straight Arrow Connector 20"/>
+          <p:cNvCxnSpPr/>
+          <p:nvPr/>
+        </p:nvCxnSpPr>
+        <p:spPr>
+          <a:xfrm flipH="1" flipV="1">
+            <a:off x="7190509" y="2044931"/>
+            <a:ext cx="274321" cy="669904"/>
+          </a:xfrm>
+          <a:prstGeom prst="straightConnector1">
+            <a:avLst/>
+          </a:prstGeom>
+          <a:ln w="28575">
+            <a:solidFill>
+              <a:schemeClr val="tx1"/>
+            </a:solidFill>
+            <a:tailEnd type="triangle"/>
+          </a:ln>
+        </p:spPr>
+        <p:style>
+          <a:lnRef idx="1">
+            <a:schemeClr val="accent1"/>
+          </a:lnRef>
+          <a:fillRef idx="0">
+            <a:schemeClr val="accent1"/>
+          </a:fillRef>
+          <a:effectRef idx="0">
+            <a:schemeClr val="accent1"/>
+          </a:effectRef>
+          <a:fontRef idx="minor">
+            <a:schemeClr val="tx1"/>
+          </a:fontRef>
+        </p:style>
+      </p:cxnSp>
+      <p:sp>
+        <p:nvSpPr>
+          <p:cNvPr id="24" name="TextBox 23"/>
+          <p:cNvSpPr txBox="1"/>
+          <p:nvPr/>
+        </p:nvSpPr>
+        <p:spPr>
+          <a:xfrm>
+            <a:off x="6488046" y="1392285"/>
+            <a:ext cx="1232945" cy="923330"/>
+          </a:xfrm>
+          <a:prstGeom prst="rect">
+            <a:avLst/>
+          </a:prstGeom>
+          <a:noFill/>
+        </p:spPr>
+        <p:txBody>
+          <a:bodyPr wrap="square" rtlCol="0">
+            <a:spAutoFit/>
+          </a:bodyPr>
+          <a:lstStyle/>
+          <a:p>
+            <a:r>
+              <a:rPr lang="tr-TR" dirty="0" smtClean="0"/>
+              <a:t>Actual</a:t>
+            </a:r>
+          </a:p>
+          <a:p>
+            <a:r>
+              <a:rPr lang="tr-TR" dirty="0" smtClean="0"/>
+              <a:t>response for SC</a:t>
+            </a:r>
+            <a:endParaRPr lang="tr-TR" dirty="0"/>
+          </a:p>
+        </p:txBody>
+      </p:sp>
+      <p:sp>
+        <p:nvSpPr>
+          <p:cNvPr id="25" name="TextBox 24"/>
+          <p:cNvSpPr txBox="1"/>
+          <p:nvPr/>
+        </p:nvSpPr>
+        <p:spPr>
+          <a:xfrm>
+            <a:off x="6524324" y="6075144"/>
+            <a:ext cx="3880657" cy="646331"/>
+          </a:xfrm>
+          <a:prstGeom prst="rect">
+            <a:avLst/>
+          </a:prstGeom>
+          <a:noFill/>
+        </p:spPr>
+        <p:txBody>
+          <a:bodyPr wrap="square" rtlCol="0">
+            <a:spAutoFit/>
+          </a:bodyPr>
+          <a:lstStyle/>
+          <a:p>
+            <a:pPr algn="ctr"/>
+            <a:r>
+              <a:rPr lang="tr-TR" dirty="0" smtClean="0"/>
+              <a:t>Probe neg. terminal is connected to variable voltage point</a:t>
+            </a:r>
+            <a:endParaRPr lang="tr-TR" dirty="0"/>
+          </a:p>
+        </p:txBody>
+      </p:sp>
+    </p:spTree>
+    <p:extLst>
+      <p:ext uri="{BB962C8B-B14F-4D97-AF65-F5344CB8AC3E}">
+        <p14:creationId xmlns:p14="http://schemas.microsoft.com/office/powerpoint/2010/main" val="216575188"/>
+      </p:ext>
+    </p:extLst>
+  </p:cSld>
+  <p:clrMapOvr>
+    <a:masterClrMapping/>
+  </p:clrMapOvr>
+  <p:timing>
+    <p:tnLst>
+      <p:par>
+        <p:cTn id="1" dur="indefinite" restart="never" nodeType="tmRoot"/>
+      </p:par>
+    </p:tnLst>
+  </p:timing>
+</p:sld>
+</file>
+
+<file path=ppt/slides/slide6.xml><?xml version="1.0" encoding="utf-8"?>
+<p:sld xmlns:a="http://schemas.openxmlformats.org/drawingml/2006/main" xmlns:r="http://schemas.openxmlformats.org/officeDocument/2006/relationships" xmlns:p="http://schemas.openxmlformats.org/presentationml/2006/main">
+  <p:cSld>
+    <p:spTree>
+      <p:nvGrpSpPr>
+        <p:cNvPr id="1" name=""/>
+        <p:cNvGrpSpPr/>
+        <p:nvPr/>
+      </p:nvGrpSpPr>
+      <p:grpSpPr>
+        <a:xfrm>
+          <a:off x="0" y="0"/>
+          <a:ext cx="0" cy="0"/>
+          <a:chOff x="0" y="0"/>
+          <a:chExt cx="0" cy="0"/>
+        </a:xfrm>
+      </p:grpSpPr>
+      <p:sp>
+        <p:nvSpPr>
+          <p:cNvPr id="4" name="Slide Number Placeholder 3"/>
+          <p:cNvSpPr>
+            <a:spLocks noGrp="1"/>
+          </p:cNvSpPr>
+          <p:nvPr>
+            <p:ph type="sldNum" sz="quarter" idx="12"/>
+          </p:nvPr>
+        </p:nvSpPr>
+        <p:spPr/>
+        <p:txBody>
+          <a:bodyPr/>
+          <a:lstStyle/>
+          <a:p>
+            <a:fld id="{178508F5-8E49-4F57-B165-331DE2AB85B8}" type="slidenum">
+              <a:rPr lang="tr-TR" sz="1800" smtClean="0"/>
+              <a:t>6</a:t>
+            </a:fld>
+            <a:endParaRPr lang="tr-TR" sz="1800" dirty="0"/>
+          </a:p>
+        </p:txBody>
+      </p:sp>
+      <p:sp>
+        <p:nvSpPr>
+          <p:cNvPr id="3" name="TextBox 2"/>
+          <p:cNvSpPr txBox="1"/>
+          <p:nvPr/>
+        </p:nvSpPr>
+        <p:spPr>
+          <a:xfrm>
+            <a:off x="223247" y="93354"/>
+            <a:ext cx="3598145" cy="461665"/>
+          </a:xfrm>
+          <a:prstGeom prst="rect">
+            <a:avLst/>
+          </a:prstGeom>
+          <a:noFill/>
+        </p:spPr>
+        <p:txBody>
+          <a:bodyPr wrap="square" rtlCol="0">
+            <a:spAutoFit/>
+          </a:bodyPr>
+          <a:lstStyle/>
+          <a:p>
+            <a:r>
+              <a:rPr lang="tr-TR" sz="2400" b="1" dirty="0" smtClean="0"/>
+              <a:t>SCT</a:t>
+            </a:r>
+            <a:endParaRPr lang="tr-TR" sz="2400" b="1" dirty="0"/>
+          </a:p>
+        </p:txBody>
+      </p:sp>
+      <p:pic>
+        <p:nvPicPr>
+          <p:cNvPr id="10" name="Picture 9"/>
+          <p:cNvPicPr>
+            <a:picLocks noChangeAspect="1"/>
+          </p:cNvPicPr>
+          <p:nvPr/>
+        </p:nvPicPr>
+        <p:blipFill>
+          <a:blip r:embed="rId2"/>
+          <a:stretch>
+            <a:fillRect/>
+          </a:stretch>
+        </p:blipFill>
+        <p:spPr>
+          <a:xfrm>
+            <a:off x="153786" y="1290935"/>
+            <a:ext cx="5355001" cy="4060000"/>
+          </a:xfrm>
+          <a:prstGeom prst="rect">
+            <a:avLst/>
+          </a:prstGeom>
+        </p:spPr>
+      </p:pic>
+      <p:pic>
+        <p:nvPicPr>
+          <p:cNvPr id="2" name="Picture 1"/>
+          <p:cNvPicPr>
+            <a:picLocks noChangeAspect="1"/>
+          </p:cNvPicPr>
+          <p:nvPr/>
+        </p:nvPicPr>
+        <p:blipFill>
+          <a:blip r:embed="rId3"/>
+          <a:stretch>
+            <a:fillRect/>
+          </a:stretch>
+        </p:blipFill>
+        <p:spPr>
+          <a:xfrm>
+            <a:off x="5440773" y="93354"/>
+            <a:ext cx="4359831" cy="3305492"/>
+          </a:xfrm>
+          <a:prstGeom prst="rect">
+            <a:avLst/>
+          </a:prstGeom>
+        </p:spPr>
+      </p:pic>
+      <p:pic>
+        <p:nvPicPr>
+          <p:cNvPr id="5" name="Picture 4"/>
+          <p:cNvPicPr>
+            <a:picLocks noChangeAspect="1"/>
+          </p:cNvPicPr>
+          <p:nvPr/>
+        </p:nvPicPr>
+        <p:blipFill rotWithShape="1">
+          <a:blip r:embed="rId4"/>
+          <a:srcRect l="15104" t="8549" r="13489" b="15489"/>
+          <a:stretch/>
+        </p:blipFill>
+        <p:spPr>
+          <a:xfrm>
+            <a:off x="7687325" y="433489"/>
+            <a:ext cx="1513592" cy="1220744"/>
+          </a:xfrm>
+          <a:prstGeom prst="rect">
+            <a:avLst/>
+          </a:prstGeom>
+        </p:spPr>
+      </p:pic>
+      <p:cxnSp>
+        <p:nvCxnSpPr>
+          <p:cNvPr id="12" name="Straight Arrow Connector 11"/>
+          <p:cNvCxnSpPr/>
+          <p:nvPr/>
+        </p:nvCxnSpPr>
+        <p:spPr>
+          <a:xfrm flipV="1">
+            <a:off x="7167321" y="1173055"/>
+            <a:ext cx="453367" cy="36253"/>
+          </a:xfrm>
+          <a:prstGeom prst="straightConnector1">
+            <a:avLst/>
+          </a:prstGeom>
+          <a:ln w="28575">
+            <a:solidFill>
+              <a:schemeClr val="tx1"/>
+            </a:solidFill>
+            <a:tailEnd type="triangle"/>
+          </a:ln>
+        </p:spPr>
+        <p:style>
+          <a:lnRef idx="1">
+            <a:schemeClr val="accent1"/>
+          </a:lnRef>
+          <a:fillRef idx="0">
+            <a:schemeClr val="accent1"/>
+          </a:fillRef>
+          <a:effectRef idx="0">
+            <a:schemeClr val="accent1"/>
+          </a:effectRef>
+          <a:fontRef idx="minor">
+            <a:schemeClr val="tx1"/>
+          </a:fontRef>
+        </p:style>
+      </p:cxnSp>
+      <p:sp>
+        <p:nvSpPr>
+          <p:cNvPr id="17" name="TextBox 16"/>
+          <p:cNvSpPr txBox="1"/>
+          <p:nvPr/>
+        </p:nvSpPr>
+        <p:spPr>
+          <a:xfrm>
+            <a:off x="9800604" y="1469567"/>
+            <a:ext cx="2357347" cy="369332"/>
+          </a:xfrm>
+          <a:prstGeom prst="rect">
+            <a:avLst/>
+          </a:prstGeom>
+          <a:noFill/>
+        </p:spPr>
+        <p:txBody>
+          <a:bodyPr wrap="square" rtlCol="0">
+            <a:spAutoFit/>
+          </a:bodyPr>
+          <a:lstStyle/>
+          <a:p>
+            <a:r>
+              <a:rPr lang="tr-TR" dirty="0" smtClean="0"/>
+              <a:t>0 &lt; f</a:t>
+            </a:r>
+            <a:r>
+              <a:rPr lang="tr-TR" baseline="-25000" dirty="0" smtClean="0"/>
+              <a:t>bandpass</a:t>
+            </a:r>
+            <a:r>
+              <a:rPr lang="tr-TR" dirty="0" smtClean="0"/>
+              <a:t> &lt; 150 MHz</a:t>
+            </a:r>
+            <a:endParaRPr lang="tr-TR" dirty="0"/>
+          </a:p>
+        </p:txBody>
+      </p:sp>
+      <p:pic>
+        <p:nvPicPr>
+          <p:cNvPr id="15" name="Picture 14"/>
+          <p:cNvPicPr>
+            <a:picLocks noChangeAspect="1"/>
+          </p:cNvPicPr>
+          <p:nvPr/>
+        </p:nvPicPr>
+        <p:blipFill>
+          <a:blip r:embed="rId5"/>
+          <a:stretch>
+            <a:fillRect/>
+          </a:stretch>
+        </p:blipFill>
+        <p:spPr>
+          <a:xfrm>
+            <a:off x="5390319" y="3430505"/>
+            <a:ext cx="4382434" cy="3322629"/>
+          </a:xfrm>
+          <a:prstGeom prst="rect">
+            <a:avLst/>
+          </a:prstGeom>
+        </p:spPr>
+      </p:pic>
+      <p:sp>
+        <p:nvSpPr>
+          <p:cNvPr id="19" name="TextBox 18"/>
+          <p:cNvSpPr txBox="1"/>
+          <p:nvPr/>
+        </p:nvSpPr>
+        <p:spPr>
+          <a:xfrm>
+            <a:off x="9772753" y="4907153"/>
+            <a:ext cx="2357347" cy="369332"/>
+          </a:xfrm>
+          <a:prstGeom prst="rect">
+            <a:avLst/>
+          </a:prstGeom>
+          <a:noFill/>
+        </p:spPr>
+        <p:txBody>
+          <a:bodyPr wrap="square" rtlCol="0">
+            <a:spAutoFit/>
+          </a:bodyPr>
+          <a:lstStyle/>
+          <a:p>
+            <a:r>
+              <a:rPr lang="tr-TR" dirty="0" smtClean="0"/>
+              <a:t>0 &lt; f</a:t>
+            </a:r>
+            <a:r>
+              <a:rPr lang="tr-TR" baseline="-25000" dirty="0" smtClean="0"/>
+              <a:t>bandpass</a:t>
+            </a:r>
+            <a:r>
+              <a:rPr lang="tr-TR" dirty="0" smtClean="0"/>
+              <a:t> &lt; 15 MHz</a:t>
+            </a:r>
+            <a:endParaRPr lang="tr-TR" dirty="0"/>
+          </a:p>
+        </p:txBody>
+      </p:sp>
+      <p:cxnSp>
+        <p:nvCxnSpPr>
+          <p:cNvPr id="21" name="Straight Arrow Connector 20"/>
+          <p:cNvCxnSpPr/>
+          <p:nvPr/>
+        </p:nvCxnSpPr>
+        <p:spPr>
+          <a:xfrm flipH="1">
+            <a:off x="10873047" y="4195035"/>
+            <a:ext cx="106230" cy="731520"/>
+          </a:xfrm>
+          <a:prstGeom prst="straightConnector1">
+            <a:avLst/>
+          </a:prstGeom>
+          <a:ln>
+            <a:tailEnd type="triangle"/>
+          </a:ln>
+        </p:spPr>
+        <p:style>
+          <a:lnRef idx="1">
+            <a:schemeClr val="accent1"/>
+          </a:lnRef>
+          <a:fillRef idx="0">
+            <a:schemeClr val="accent1"/>
+          </a:fillRef>
+          <a:effectRef idx="0">
+            <a:schemeClr val="accent1"/>
+          </a:effectRef>
+          <a:fontRef idx="minor">
+            <a:schemeClr val="tx1"/>
+          </a:fontRef>
+        </p:style>
+      </p:cxnSp>
+      <p:sp>
+        <p:nvSpPr>
+          <p:cNvPr id="22" name="TextBox 21"/>
+          <p:cNvSpPr txBox="1"/>
+          <p:nvPr/>
+        </p:nvSpPr>
+        <p:spPr>
+          <a:xfrm>
+            <a:off x="9989127" y="3817682"/>
+            <a:ext cx="2357347" cy="369332"/>
+          </a:xfrm>
+          <a:prstGeom prst="rect">
+            <a:avLst/>
+          </a:prstGeom>
+          <a:noFill/>
+        </p:spPr>
+        <p:txBody>
+          <a:bodyPr wrap="square" rtlCol="0">
+            <a:spAutoFit/>
+          </a:bodyPr>
+          <a:lstStyle/>
+          <a:p>
+            <a:r>
+              <a:rPr lang="tr-TR" dirty="0" smtClean="0"/>
+              <a:t>On-board R-C filter</a:t>
+            </a:r>
+            <a:endParaRPr lang="tr-TR" dirty="0"/>
+          </a:p>
+        </p:txBody>
+      </p:sp>
+    </p:spTree>
+    <p:extLst>
+      <p:ext uri="{BB962C8B-B14F-4D97-AF65-F5344CB8AC3E}">
+        <p14:creationId xmlns:p14="http://schemas.microsoft.com/office/powerpoint/2010/main" val="4024555206"/>
+      </p:ext>
+    </p:extLst>
+  </p:cSld>
+  <p:clrMapOvr>
+    <a:masterClrMapping/>
+  </p:clrMapOvr>
+  <p:timing>
+    <p:tnLst>
+      <p:par>
+        <p:cTn id="1" dur="indefinite" restart="never" nodeType="tmRoot"/>
+      </p:par>
+    </p:tnLst>
+  </p:timing>
+</p:sld>
+</file>
+
+<file path=ppt/slides/slide7.xml><?xml version="1.0" encoding="utf-8"?>
+<p:sld xmlns:a="http://schemas.openxmlformats.org/drawingml/2006/main" xmlns:r="http://schemas.openxmlformats.org/officeDocument/2006/relationships" xmlns:p="http://schemas.openxmlformats.org/presentationml/2006/main">
+  <p:cSld>
+    <p:spTree>
+      <p:nvGrpSpPr>
+        <p:cNvPr id="1" name=""/>
+        <p:cNvGrpSpPr/>
+        <p:nvPr/>
+      </p:nvGrpSpPr>
+      <p:grpSpPr>
+        <a:xfrm>
+          <a:off x="0" y="0"/>
+          <a:ext cx="0" cy="0"/>
+          <a:chOff x="0" y="0"/>
+          <a:chExt cx="0" cy="0"/>
+        </a:xfrm>
+      </p:grpSpPr>
+      <p:sp>
+        <p:nvSpPr>
+          <p:cNvPr id="4" name="Slide Number Placeholder 3"/>
+          <p:cNvSpPr>
+            <a:spLocks noGrp="1"/>
+          </p:cNvSpPr>
+          <p:nvPr>
+            <p:ph type="sldNum" sz="quarter" idx="12"/>
+          </p:nvPr>
+        </p:nvSpPr>
+        <p:spPr/>
+        <p:txBody>
+          <a:bodyPr/>
+          <a:lstStyle/>
+          <a:p>
+            <a:fld id="{178508F5-8E49-4F57-B165-331DE2AB85B8}" type="slidenum">
+              <a:rPr lang="tr-TR" sz="1800" smtClean="0"/>
+              <a:t>7</a:t>
+            </a:fld>
+            <a:endParaRPr lang="tr-TR" sz="1800" dirty="0"/>
+          </a:p>
+        </p:txBody>
+      </p:sp>
+      <p:sp>
+        <p:nvSpPr>
+          <p:cNvPr id="3" name="TextBox 2"/>
+          <p:cNvSpPr txBox="1"/>
+          <p:nvPr/>
+        </p:nvSpPr>
+        <p:spPr>
+          <a:xfrm>
+            <a:off x="223247" y="93354"/>
+            <a:ext cx="3598145" cy="461665"/>
+          </a:xfrm>
+          <a:prstGeom prst="rect">
+            <a:avLst/>
+          </a:prstGeom>
+          <a:noFill/>
+        </p:spPr>
+        <p:txBody>
+          <a:bodyPr wrap="square" rtlCol="0">
+            <a:spAutoFit/>
+          </a:bodyPr>
+          <a:lstStyle/>
+          <a:p>
+            <a:r>
+              <a:rPr lang="tr-TR" sz="2400" b="1" dirty="0" smtClean="0"/>
+              <a:t>SCT</a:t>
+            </a:r>
+            <a:endParaRPr lang="tr-TR" sz="2400" b="1" dirty="0"/>
+          </a:p>
+        </p:txBody>
+      </p:sp>
+      <p:pic>
+        <p:nvPicPr>
+          <p:cNvPr id="8" name="Picture 7"/>
+          <p:cNvPicPr>
+            <a:picLocks noChangeAspect="1"/>
+          </p:cNvPicPr>
+          <p:nvPr/>
+        </p:nvPicPr>
+        <p:blipFill>
+          <a:blip r:embed="rId2"/>
+          <a:stretch>
+            <a:fillRect/>
+          </a:stretch>
+        </p:blipFill>
+        <p:spPr>
+          <a:xfrm>
+            <a:off x="6042149" y="1181445"/>
+            <a:ext cx="5700012" cy="4321577"/>
+          </a:xfrm>
+          <a:prstGeom prst="rect">
+            <a:avLst/>
+          </a:prstGeom>
+        </p:spPr>
+      </p:pic>
+      <p:sp>
+        <p:nvSpPr>
+          <p:cNvPr id="20" name="TextBox 19"/>
+          <p:cNvSpPr txBox="1"/>
+          <p:nvPr/>
+        </p:nvSpPr>
+        <p:spPr>
+          <a:xfrm>
+            <a:off x="3366656" y="4395336"/>
+            <a:ext cx="3075708" cy="646331"/>
+          </a:xfrm>
+          <a:prstGeom prst="rect">
+            <a:avLst/>
+          </a:prstGeom>
+          <a:noFill/>
+        </p:spPr>
+        <p:txBody>
+          <a:bodyPr wrap="square" rtlCol="0">
+            <a:spAutoFit/>
+          </a:bodyPr>
+          <a:lstStyle/>
+          <a:p>
+            <a:pPr algn="ctr"/>
+            <a:r>
+              <a:rPr lang="tr-TR" dirty="0" smtClean="0"/>
+              <a:t>BONUS</a:t>
+            </a:r>
+            <a:br>
+              <a:rPr lang="tr-TR" dirty="0" smtClean="0"/>
+            </a:br>
+            <a:r>
+              <a:rPr lang="tr-TR" dirty="0" smtClean="0"/>
+              <a:t>How to decide threshold level?</a:t>
+            </a:r>
+            <a:endParaRPr lang="tr-TR" dirty="0"/>
+          </a:p>
+        </p:txBody>
+      </p:sp>
+      <p:cxnSp>
+        <p:nvCxnSpPr>
+          <p:cNvPr id="23" name="Straight Arrow Connector 22"/>
+          <p:cNvCxnSpPr/>
+          <p:nvPr/>
+        </p:nvCxnSpPr>
+        <p:spPr>
+          <a:xfrm flipH="1">
+            <a:off x="6042149" y="3092335"/>
+            <a:ext cx="1830005" cy="1487978"/>
+          </a:xfrm>
+          <a:prstGeom prst="straightConnector1">
+            <a:avLst/>
+          </a:prstGeom>
+          <a:ln w="28575">
+            <a:solidFill>
+              <a:schemeClr val="tx1"/>
+            </a:solidFill>
+            <a:tailEnd type="triangle"/>
+          </a:ln>
+        </p:spPr>
+        <p:style>
+          <a:lnRef idx="1">
+            <a:schemeClr val="accent1"/>
+          </a:lnRef>
+          <a:fillRef idx="0">
+            <a:schemeClr val="accent1"/>
+          </a:fillRef>
+          <a:effectRef idx="0">
+            <a:schemeClr val="accent1"/>
+          </a:effectRef>
+          <a:fontRef idx="minor">
+            <a:schemeClr val="tx1"/>
+          </a:fontRef>
+        </p:style>
+      </p:cxnSp>
+    </p:spTree>
+    <p:extLst>
+      <p:ext uri="{BB962C8B-B14F-4D97-AF65-F5344CB8AC3E}">
+        <p14:creationId xmlns:p14="http://schemas.microsoft.com/office/powerpoint/2010/main" val="1708447041"/>
+      </p:ext>
+    </p:extLst>
+  </p:cSld>
+  <p:clrMapOvr>
+    <a:masterClrMapping/>
+  </p:clrMapOvr>
+  <p:timing>
+    <p:tnLst>
+      <p:par>
+        <p:cTn id="1" dur="indefinite" restart="never" nodeType="tmRoot"/>
+      </p:par>
+    </p:tnLst>
+  </p:timing>
+</p:sld>
+</file>
+
+<file path=ppt/slides/slide8.xml><?xml version="1.0" encoding="utf-8"?>
+<p:sld xmlns:a="http://schemas.openxmlformats.org/drawingml/2006/main" xmlns:r="http://schemas.openxmlformats.org/officeDocument/2006/relationships" xmlns:p="http://schemas.openxmlformats.org/presentationml/2006/main">
+  <p:cSld>
+    <p:spTree>
+      <p:nvGrpSpPr>
+        <p:cNvPr id="1" name=""/>
+        <p:cNvGrpSpPr/>
+        <p:nvPr/>
+      </p:nvGrpSpPr>
+      <p:grpSpPr>
+        <a:xfrm>
+          <a:off x="0" y="0"/>
+          <a:ext cx="0" cy="0"/>
+          <a:chOff x="0" y="0"/>
+          <a:chExt cx="0" cy="0"/>
+        </a:xfrm>
+      </p:grpSpPr>
+      <p:sp>
+        <p:nvSpPr>
+          <p:cNvPr id="4" name="Slide Number Placeholder 3"/>
+          <p:cNvSpPr>
+            <a:spLocks noGrp="1"/>
+          </p:cNvSpPr>
+          <p:nvPr>
+            <p:ph type="sldNum" sz="quarter" idx="12"/>
+          </p:nvPr>
+        </p:nvSpPr>
+        <p:spPr/>
+        <p:txBody>
+          <a:bodyPr/>
+          <a:lstStyle/>
+          <a:p>
+            <a:fld id="{178508F5-8E49-4F57-B165-331DE2AB85B8}" type="slidenum">
+              <a:rPr lang="tr-TR" sz="1800" smtClean="0"/>
+              <a:t>8</a:t>
+            </a:fld>
+            <a:endParaRPr lang="tr-TR" sz="1800" dirty="0"/>
+          </a:p>
+        </p:txBody>
+      </p:sp>
+      <p:sp>
+        <p:nvSpPr>
+          <p:cNvPr id="3" name="TextBox 2"/>
+          <p:cNvSpPr txBox="1"/>
+          <p:nvPr/>
+        </p:nvSpPr>
+        <p:spPr>
+          <a:xfrm>
+            <a:off x="223247" y="93354"/>
+            <a:ext cx="3598145" cy="461665"/>
+          </a:xfrm>
+          <a:prstGeom prst="rect">
+            <a:avLst/>
+          </a:prstGeom>
+          <a:noFill/>
+        </p:spPr>
+        <p:txBody>
+          <a:bodyPr wrap="square" rtlCol="0">
+            <a:spAutoFit/>
+          </a:bodyPr>
+          <a:lstStyle/>
+          <a:p>
+            <a:r>
+              <a:rPr lang="tr-TR" sz="2400" b="1" dirty="0" smtClean="0"/>
+              <a:t>SCT</a:t>
+            </a:r>
+            <a:endParaRPr lang="tr-TR" sz="2400" b="1" dirty="0"/>
+          </a:p>
+        </p:txBody>
+      </p:sp>
+      <p:pic>
+        <p:nvPicPr>
+          <p:cNvPr id="5" name="Picture 4"/>
+          <p:cNvPicPr>
+            <a:picLocks noChangeAspect="1"/>
+          </p:cNvPicPr>
+          <p:nvPr/>
+        </p:nvPicPr>
+        <p:blipFill>
+          <a:blip r:embed="rId2"/>
+          <a:stretch>
+            <a:fillRect/>
+          </a:stretch>
+        </p:blipFill>
+        <p:spPr>
+          <a:xfrm>
+            <a:off x="392665" y="1399000"/>
+            <a:ext cx="5355001" cy="4060000"/>
+          </a:xfrm>
+          <a:prstGeom prst="rect">
+            <a:avLst/>
+          </a:prstGeom>
+        </p:spPr>
+      </p:pic>
+      <p:pic>
+        <p:nvPicPr>
+          <p:cNvPr id="9" name="Picture 8"/>
+          <p:cNvPicPr>
+            <a:picLocks noChangeAspect="1"/>
+          </p:cNvPicPr>
+          <p:nvPr/>
+        </p:nvPicPr>
+        <p:blipFill>
+          <a:blip r:embed="rId3"/>
+          <a:stretch>
+            <a:fillRect/>
+          </a:stretch>
+        </p:blipFill>
+        <p:spPr>
+          <a:xfrm>
+            <a:off x="5998799" y="1399000"/>
+            <a:ext cx="5355001" cy="4060000"/>
+          </a:xfrm>
+          <a:prstGeom prst="rect">
+            <a:avLst/>
+          </a:prstGeom>
+        </p:spPr>
+      </p:pic>
+      <p:sp>
+        <p:nvSpPr>
+          <p:cNvPr id="10" name="TextBox 9"/>
+          <p:cNvSpPr txBox="1"/>
+          <p:nvPr/>
+        </p:nvSpPr>
+        <p:spPr>
+          <a:xfrm>
+            <a:off x="1975810" y="5459000"/>
+            <a:ext cx="2188710" cy="369332"/>
+          </a:xfrm>
+          <a:prstGeom prst="rect">
+            <a:avLst/>
+          </a:prstGeom>
+          <a:noFill/>
+        </p:spPr>
+        <p:txBody>
+          <a:bodyPr wrap="square" rtlCol="0">
+            <a:spAutoFit/>
+          </a:bodyPr>
+          <a:lstStyle/>
+          <a:p>
+            <a:r>
+              <a:rPr lang="tr-TR" dirty="0" smtClean="0"/>
+              <a:t>SC exists for 200 nsec</a:t>
+            </a:r>
+            <a:endParaRPr lang="tr-TR" dirty="0"/>
+          </a:p>
+        </p:txBody>
+      </p:sp>
+      <p:sp>
+        <p:nvSpPr>
+          <p:cNvPr id="11" name="TextBox 10"/>
+          <p:cNvSpPr txBox="1"/>
+          <p:nvPr/>
+        </p:nvSpPr>
+        <p:spPr>
+          <a:xfrm>
+            <a:off x="7581944" y="5459000"/>
+            <a:ext cx="2188710" cy="369332"/>
+          </a:xfrm>
+          <a:prstGeom prst="rect">
+            <a:avLst/>
+          </a:prstGeom>
+          <a:noFill/>
+        </p:spPr>
+        <p:txBody>
+          <a:bodyPr wrap="square" rtlCol="0">
+            <a:spAutoFit/>
+          </a:bodyPr>
+          <a:lstStyle/>
+          <a:p>
+            <a:r>
+              <a:rPr lang="tr-TR" dirty="0" smtClean="0"/>
+              <a:t>SC exists for 100 nsec</a:t>
+            </a:r>
+            <a:endParaRPr lang="tr-TR" dirty="0"/>
+          </a:p>
+        </p:txBody>
+      </p:sp>
+    </p:spTree>
+    <p:extLst>
+      <p:ext uri="{BB962C8B-B14F-4D97-AF65-F5344CB8AC3E}">
+        <p14:creationId xmlns:p14="http://schemas.microsoft.com/office/powerpoint/2010/main" val="343743743"/>
+      </p:ext>
+    </p:extLst>
+  </p:cSld>
+  <p:clrMapOvr>
+    <a:masterClrMapping/>
+  </p:clrMapOvr>
+  <p:timing>
+    <p:tnLst>
+      <p:par>
+        <p:cTn id="1" dur="indefinite" restart="never" nodeType="tmRoot"/>
+      </p:par>
+    </p:tnLst>
+  </p:timing>
+</p:sld>
+</file>
+
+<file path=ppt/slides/slide9.xml><?xml version="1.0" encoding="utf-8"?>
+<p:sld xmlns:a="http://schemas.openxmlformats.org/drawingml/2006/main" xmlns:r="http://schemas.openxmlformats.org/officeDocument/2006/relationships" xmlns:p="http://schemas.openxmlformats.org/presentationml/2006/main">
+  <p:cSld>
+    <p:spTree>
+      <p:nvGrpSpPr>
+        <p:cNvPr id="1" name=""/>
+        <p:cNvGrpSpPr/>
+        <p:nvPr/>
+      </p:nvGrpSpPr>
+      <p:grpSpPr>
+        <a:xfrm>
+          <a:off x="0" y="0"/>
+          <a:ext cx="0" cy="0"/>
+          <a:chOff x="0" y="0"/>
+          <a:chExt cx="0" cy="0"/>
+        </a:xfrm>
+      </p:grpSpPr>
+      <p:sp>
+        <p:nvSpPr>
+          <p:cNvPr id="4" name="Slide Number Placeholder 3"/>
+          <p:cNvSpPr>
+            <a:spLocks noGrp="1"/>
+          </p:cNvSpPr>
+          <p:nvPr>
+            <p:ph type="sldNum" sz="quarter" idx="12"/>
+          </p:nvPr>
+        </p:nvSpPr>
+        <p:spPr/>
+        <p:txBody>
+          <a:bodyPr/>
+          <a:lstStyle/>
+          <a:p>
+            <a:fld id="{178508F5-8E49-4F57-B165-331DE2AB85B8}" type="slidenum">
+              <a:rPr lang="tr-TR" sz="1800" smtClean="0"/>
+              <a:t>9</a:t>
+            </a:fld>
+            <a:endParaRPr lang="tr-TR" sz="1800" dirty="0"/>
+          </a:p>
+        </p:txBody>
+      </p:sp>
+      <p:sp>
+        <p:nvSpPr>
+          <p:cNvPr id="3" name="TextBox 2"/>
+          <p:cNvSpPr txBox="1"/>
+          <p:nvPr/>
+        </p:nvSpPr>
+        <p:spPr>
+          <a:xfrm>
+            <a:off x="223247" y="93354"/>
+            <a:ext cx="3598145" cy="461665"/>
+          </a:xfrm>
+          <a:prstGeom prst="rect">
+            <a:avLst/>
+          </a:prstGeom>
+          <a:noFill/>
+        </p:spPr>
+        <p:txBody>
+          <a:bodyPr wrap="square" rtlCol="0">
+            <a:spAutoFit/>
+          </a:bodyPr>
+          <a:lstStyle/>
+          <a:p>
+            <a:r>
+              <a:rPr lang="tr-TR" sz="2400" b="1" dirty="0" smtClean="0"/>
+              <a:t>SCT</a:t>
+            </a:r>
+            <a:endParaRPr lang="tr-TR" sz="2400" b="1" dirty="0"/>
+          </a:p>
+        </p:txBody>
+      </p:sp>
+      <p:pic>
+        <p:nvPicPr>
+          <p:cNvPr id="6" name="Picture 5"/>
+          <p:cNvPicPr>
+            <a:picLocks noChangeAspect="1"/>
+          </p:cNvPicPr>
+          <p:nvPr/>
+        </p:nvPicPr>
+        <p:blipFill>
+          <a:blip r:embed="rId2"/>
+          <a:stretch>
+            <a:fillRect/>
+          </a:stretch>
+        </p:blipFill>
+        <p:spPr>
+          <a:xfrm>
+            <a:off x="6103510" y="1415626"/>
+            <a:ext cx="5355001" cy="4060000"/>
+          </a:xfrm>
+          <a:prstGeom prst="rect">
+            <a:avLst/>
+          </a:prstGeom>
+        </p:spPr>
+      </p:pic>
+      <p:pic>
+        <p:nvPicPr>
+          <p:cNvPr id="7" name="Picture 6"/>
+          <p:cNvPicPr>
+            <a:picLocks noChangeAspect="1"/>
+          </p:cNvPicPr>
+          <p:nvPr/>
+        </p:nvPicPr>
+        <p:blipFill>
+          <a:blip r:embed="rId3"/>
+          <a:stretch>
+            <a:fillRect/>
+          </a:stretch>
+        </p:blipFill>
+        <p:spPr>
+          <a:xfrm>
+            <a:off x="542295" y="1415626"/>
+            <a:ext cx="5355001" cy="4060000"/>
+          </a:xfrm>
+          <a:prstGeom prst="rect">
+            <a:avLst/>
+          </a:prstGeom>
+        </p:spPr>
+      </p:pic>
+      <p:sp>
+        <p:nvSpPr>
+          <p:cNvPr id="12" name="TextBox 11"/>
+          <p:cNvSpPr txBox="1"/>
+          <p:nvPr/>
+        </p:nvSpPr>
+        <p:spPr>
+          <a:xfrm>
+            <a:off x="2865195" y="5475626"/>
+            <a:ext cx="709200" cy="369332"/>
+          </a:xfrm>
+          <a:prstGeom prst="rect">
+            <a:avLst/>
+          </a:prstGeom>
+          <a:noFill/>
+        </p:spPr>
+        <p:txBody>
+          <a:bodyPr wrap="square" rtlCol="0">
+            <a:spAutoFit/>
+          </a:bodyPr>
+          <a:lstStyle/>
+          <a:p>
+            <a:r>
+              <a:rPr lang="tr-TR" dirty="0" smtClean="0"/>
+              <a:t>100V</a:t>
+            </a:r>
+            <a:endParaRPr lang="tr-TR" dirty="0"/>
+          </a:p>
+        </p:txBody>
+      </p:sp>
+      <p:sp>
+        <p:nvSpPr>
+          <p:cNvPr id="13" name="TextBox 12"/>
+          <p:cNvSpPr txBox="1"/>
+          <p:nvPr/>
+        </p:nvSpPr>
+        <p:spPr>
+          <a:xfrm>
+            <a:off x="8426410" y="5475626"/>
+            <a:ext cx="709200" cy="369332"/>
+          </a:xfrm>
+          <a:prstGeom prst="rect">
+            <a:avLst/>
+          </a:prstGeom>
+          <a:noFill/>
+        </p:spPr>
+        <p:txBody>
+          <a:bodyPr wrap="square" rtlCol="0">
+            <a:spAutoFit/>
+          </a:bodyPr>
+          <a:lstStyle/>
+          <a:p>
+            <a:r>
+              <a:rPr lang="tr-TR" dirty="0"/>
+              <a:t>2</a:t>
+            </a:r>
+            <a:r>
+              <a:rPr lang="tr-TR" dirty="0" smtClean="0"/>
+              <a:t>00V</a:t>
+            </a:r>
+            <a:endParaRPr lang="tr-TR" dirty="0"/>
+          </a:p>
+        </p:txBody>
+      </p:sp>
+    </p:spTree>
+    <p:extLst>
+      <p:ext uri="{BB962C8B-B14F-4D97-AF65-F5344CB8AC3E}">
+        <p14:creationId xmlns:p14="http://schemas.microsoft.com/office/powerpoint/2010/main" val="663948121"/>
       </p:ext>
     </p:extLst>
   </p:cSld>

</xml_diff>